<commit_message>
one more cell to include timeseries cleanup
</commit_message>
<xml_diff>
--- a/docs/slides/17-Timeseries.pptx
+++ b/docs/slides/17-Timeseries.pptx
@@ -5,13 +5,16 @@
     <p:sldMasterId id="2147483648" r:id="rId1"/>
   </p:sldMasterIdLst>
   <p:notesMasterIdLst>
-    <p:notesMasterId r:id="rId6"/>
+    <p:notesMasterId r:id="rId9"/>
   </p:notesMasterIdLst>
   <p:sldIdLst>
     <p:sldId id="453" r:id="rId2"/>
-    <p:sldId id="454" r:id="rId3"/>
-    <p:sldId id="456" r:id="rId4"/>
-    <p:sldId id="455" r:id="rId5"/>
+    <p:sldId id="457" r:id="rId3"/>
+    <p:sldId id="458" r:id="rId4"/>
+    <p:sldId id="454" r:id="rId5"/>
+    <p:sldId id="456" r:id="rId6"/>
+    <p:sldId id="459" r:id="rId7"/>
+    <p:sldId id="455" r:id="rId8"/>
   </p:sldIdLst>
   <p:sldSz cx="12192000" cy="6858000"/>
   <p:notesSz cx="6858000" cy="9144000"/>
@@ -532,7 +535,7 @@
           <a:p>
             <a:fld id="{F3EDB452-00BF-924C-9465-03C1104CE954}" type="slidenum">
               <a:rPr lang="en-US" smtClean="0"/>
-              <a:t>2</a:t>
+              <a:t>4</a:t>
             </a:fld>
             <a:endParaRPr lang="en-US"/>
           </a:p>
@@ -736,7 +739,7 @@
           <a:p>
             <a:fld id="{4BA81B79-C773-3E49-9E35-0B8AFF72700E}" type="slidenum">
               <a:rPr lang="en-US" smtClean="0"/>
-              <a:t>3</a:t>
+              <a:t>5</a:t>
             </a:fld>
             <a:endParaRPr lang="en-US"/>
           </a:p>
@@ -869,7 +872,7 @@
           <a:p>
             <a:fld id="{4BA81B79-C773-3E49-9E35-0B8AFF72700E}" type="slidenum">
               <a:rPr lang="en-US" smtClean="0"/>
-              <a:t>4</a:t>
+              <a:t>7</a:t>
             </a:fld>
             <a:endParaRPr lang="en-US"/>
           </a:p>
@@ -4195,6 +4198,149 @@
           <a:chExt cx="0" cy="0"/>
         </a:xfrm>
       </p:grpSpPr>
+      <p:pic>
+        <p:nvPicPr>
+          <p:cNvPr id="4" name="Picture 3">
+            <a:extLst>
+              <a:ext uri="{FF2B5EF4-FFF2-40B4-BE49-F238E27FC236}">
+                <a16:creationId xmlns:a16="http://schemas.microsoft.com/office/drawing/2014/main" id="{0BA81C87-CDE2-A472-E71F-4F471E18CCA6}"/>
+              </a:ext>
+            </a:extLst>
+          </p:cNvPr>
+          <p:cNvPicPr>
+            <a:picLocks noChangeAspect="1"/>
+          </p:cNvPicPr>
+          <p:nvPr/>
+        </p:nvPicPr>
+        <p:blipFill>
+          <a:blip r:embed="rId2"/>
+          <a:stretch>
+            <a:fillRect/>
+          </a:stretch>
+        </p:blipFill>
+        <p:spPr>
+          <a:xfrm>
+            <a:off x="1013255" y="427635"/>
+            <a:ext cx="9539416" cy="6430365"/>
+          </a:xfrm>
+          <a:prstGeom prst="rect">
+            <a:avLst/>
+          </a:prstGeom>
+        </p:spPr>
+      </p:pic>
+    </p:spTree>
+    <p:extLst>
+      <p:ext uri="{BB962C8B-B14F-4D97-AF65-F5344CB8AC3E}">
+        <p14:creationId xmlns:p14="http://schemas.microsoft.com/office/powerpoint/2010/main" val="1330961716"/>
+      </p:ext>
+    </p:extLst>
+  </p:cSld>
+  <p:clrMapOvr>
+    <a:masterClrMapping/>
+  </p:clrMapOvr>
+</p:sld>
+</file>
+
+<file path=ppt/slides/slide3.xml><?xml version="1.0" encoding="utf-8"?>
+<p:sld xmlns:a="http://schemas.openxmlformats.org/drawingml/2006/main" xmlns:r="http://schemas.openxmlformats.org/officeDocument/2006/relationships" xmlns:p="http://schemas.openxmlformats.org/presentationml/2006/main">
+  <p:cSld>
+    <p:spTree>
+      <p:nvGrpSpPr>
+        <p:cNvPr id="1" name=""/>
+        <p:cNvGrpSpPr/>
+        <p:nvPr/>
+      </p:nvGrpSpPr>
+      <p:grpSpPr>
+        <a:xfrm>
+          <a:off x="0" y="0"/>
+          <a:ext cx="0" cy="0"/>
+          <a:chOff x="0" y="0"/>
+          <a:chExt cx="0" cy="0"/>
+        </a:xfrm>
+      </p:grpSpPr>
+      <p:sp>
+        <p:nvSpPr>
+          <p:cNvPr id="3" name="Title 2">
+            <a:extLst>
+              <a:ext uri="{FF2B5EF4-FFF2-40B4-BE49-F238E27FC236}">
+                <a16:creationId xmlns:a16="http://schemas.microsoft.com/office/drawing/2014/main" id="{1ADB5C07-B678-C61E-DDD6-E75C7D34881D}"/>
+              </a:ext>
+            </a:extLst>
+          </p:cNvPr>
+          <p:cNvSpPr>
+            <a:spLocks noGrp="1"/>
+          </p:cNvSpPr>
+          <p:nvPr>
+            <p:ph type="title"/>
+          </p:nvPr>
+        </p:nvSpPr>
+        <p:spPr/>
+        <p:txBody>
+          <a:bodyPr/>
+          <a:lstStyle/>
+          <a:p>
+            <a:r>
+              <a:rPr lang="en-US" dirty="0"/>
+              <a:t>Anomaly Detection</a:t>
+            </a:r>
+          </a:p>
+        </p:txBody>
+      </p:sp>
+      <p:sp>
+        <p:nvSpPr>
+          <p:cNvPr id="4" name="Content Placeholder 3">
+            <a:extLst>
+              <a:ext uri="{FF2B5EF4-FFF2-40B4-BE49-F238E27FC236}">
+                <a16:creationId xmlns:a16="http://schemas.microsoft.com/office/drawing/2014/main" id="{8257C0CB-51E4-AFF8-6104-E5CB711952B7}"/>
+              </a:ext>
+            </a:extLst>
+          </p:cNvPr>
+          <p:cNvSpPr>
+            <a:spLocks noGrp="1"/>
+          </p:cNvSpPr>
+          <p:nvPr>
+            <p:ph idx="1"/>
+          </p:nvPr>
+        </p:nvSpPr>
+        <p:spPr/>
+        <p:txBody>
+          <a:bodyPr/>
+          <a:lstStyle/>
+          <a:p>
+            <a:endParaRPr lang="en-US"/>
+          </a:p>
+        </p:txBody>
+      </p:sp>
+    </p:spTree>
+    <p:extLst>
+      <p:ext uri="{BB962C8B-B14F-4D97-AF65-F5344CB8AC3E}">
+        <p14:creationId xmlns:p14="http://schemas.microsoft.com/office/powerpoint/2010/main" val="3314442948"/>
+      </p:ext>
+    </p:extLst>
+  </p:cSld>
+  <p:clrMapOvr>
+    <a:masterClrMapping/>
+  </p:clrMapOvr>
+</p:sld>
+</file>
+
+<file path=ppt/slides/slide4.xml><?xml version="1.0" encoding="utf-8"?>
+<p:sld xmlns:a="http://schemas.openxmlformats.org/drawingml/2006/main" xmlns:r="http://schemas.openxmlformats.org/officeDocument/2006/relationships" xmlns:p="http://schemas.openxmlformats.org/presentationml/2006/main">
+  <p:cSld>
+    <p:spTree>
+      <p:nvGrpSpPr>
+        <p:cNvPr id="1" name=""/>
+        <p:cNvGrpSpPr/>
+        <p:nvPr/>
+      </p:nvGrpSpPr>
+      <p:grpSpPr>
+        <a:xfrm>
+          <a:off x="0" y="0"/>
+          <a:ext cx="0" cy="0"/>
+          <a:chOff x="0" y="0"/>
+          <a:chExt cx="0" cy="0"/>
+        </a:xfrm>
+      </p:grpSpPr>
       <p:sp>
         <p:nvSpPr>
           <p:cNvPr id="2" name="Title 1">
@@ -4244,7 +4390,7 @@
 </p:sld>
 </file>
 
-<file path=ppt/slides/slide3.xml><?xml version="1.0" encoding="utf-8"?>
+<file path=ppt/slides/slide5.xml><?xml version="1.0" encoding="utf-8"?>
 <p:sld xmlns:a="http://schemas.openxmlformats.org/drawingml/2006/main" xmlns:r="http://schemas.openxmlformats.org/officeDocument/2006/relationships" xmlns:p="http://schemas.openxmlformats.org/presentationml/2006/main">
   <p:cSld>
     <p:spTree>
@@ -4470,7 +4616,173 @@
 </p:sld>
 </file>
 
-<file path=ppt/slides/slide4.xml><?xml version="1.0" encoding="utf-8"?>
+<file path=ppt/slides/slide6.xml><?xml version="1.0" encoding="utf-8"?>
+<p:sld xmlns:a="http://schemas.openxmlformats.org/drawingml/2006/main" xmlns:r="http://schemas.openxmlformats.org/officeDocument/2006/relationships" xmlns:p="http://schemas.openxmlformats.org/presentationml/2006/main">
+  <p:cSld>
+    <p:spTree>
+      <p:nvGrpSpPr>
+        <p:cNvPr id="1" name=""/>
+        <p:cNvGrpSpPr/>
+        <p:nvPr/>
+      </p:nvGrpSpPr>
+      <p:grpSpPr>
+        <a:xfrm>
+          <a:off x="0" y="0"/>
+          <a:ext cx="0" cy="0"/>
+          <a:chOff x="0" y="0"/>
+          <a:chExt cx="0" cy="0"/>
+        </a:xfrm>
+      </p:grpSpPr>
+      <p:sp>
+        <p:nvSpPr>
+          <p:cNvPr id="2" name="Title 1">
+            <a:extLst>
+              <a:ext uri="{FF2B5EF4-FFF2-40B4-BE49-F238E27FC236}">
+                <a16:creationId xmlns:a16="http://schemas.microsoft.com/office/drawing/2014/main" id="{15498EEA-127C-6A8F-9481-AD254ED3B9A4}"/>
+              </a:ext>
+            </a:extLst>
+          </p:cNvPr>
+          <p:cNvSpPr>
+            <a:spLocks noGrp="1"/>
+          </p:cNvSpPr>
+          <p:nvPr>
+            <p:ph type="title"/>
+          </p:nvPr>
+        </p:nvSpPr>
+        <p:spPr/>
+        <p:txBody>
+          <a:bodyPr/>
+          <a:lstStyle/>
+          <a:p>
+            <a:r>
+              <a:rPr lang="en-US"/>
+              <a:t>ARIMA Parameters</a:t>
+            </a:r>
+          </a:p>
+        </p:txBody>
+      </p:sp>
+      <p:sp>
+        <p:nvSpPr>
+          <p:cNvPr id="3" name="Content Placeholder 2">
+            <a:extLst>
+              <a:ext uri="{FF2B5EF4-FFF2-40B4-BE49-F238E27FC236}">
+                <a16:creationId xmlns:a16="http://schemas.microsoft.com/office/drawing/2014/main" id="{A99C3F5E-FA5A-8ED1-EFBA-531A6A5F42BB}"/>
+              </a:ext>
+            </a:extLst>
+          </p:cNvPr>
+          <p:cNvSpPr>
+            <a:spLocks noGrp="1"/>
+          </p:cNvSpPr>
+          <p:nvPr>
+            <p:ph idx="1"/>
+          </p:nvPr>
+        </p:nvSpPr>
+        <p:spPr/>
+        <p:txBody>
+          <a:bodyPr>
+            <a:normAutofit lnSpcReduction="10000"/>
+          </a:bodyPr>
+          <a:lstStyle/>
+          <a:p>
+            <a:pPr algn="l"/>
+            <a:r>
+              <a:rPr lang="en-US" b="0" i="0" dirty="0">
+                <a:solidFill>
+                  <a:srgbClr val="111111"/>
+                </a:solidFill>
+                <a:effectLst/>
+                <a:latin typeface="SourceSansPro"/>
+              </a:rPr>
+              <a:t>Each component in ARIMA functions as a parameter with a standard notation. For ARIMA models, a standard notation would be ARIMA with p, d, and q, where integer values substitute for the parameters to indicate the type of ARIMA model used. The parameters can be defined as:</a:t>
+            </a:r>
+          </a:p>
+          <a:p>
+            <a:pPr algn="l">
+              <a:buFont typeface="Arial" panose="020B0604020202020204" pitchFamily="34" charset="0"/>
+              <a:buChar char="•"/>
+            </a:pPr>
+            <a:r>
+              <a:rPr lang="en-US" b="0" i="1" dirty="0">
+                <a:solidFill>
+                  <a:srgbClr val="111111"/>
+                </a:solidFill>
+                <a:effectLst/>
+                <a:latin typeface="SourceSansPro"/>
+              </a:rPr>
+              <a:t>p</a:t>
+            </a:r>
+            <a:r>
+              <a:rPr lang="en-US" b="0" i="0" dirty="0">
+                <a:solidFill>
+                  <a:srgbClr val="111111"/>
+                </a:solidFill>
+                <a:effectLst/>
+                <a:latin typeface="SourceSansPro"/>
+              </a:rPr>
+              <a:t>: the number of lag observations in the model; also known as the lag order.</a:t>
+            </a:r>
+          </a:p>
+          <a:p>
+            <a:pPr algn="l">
+              <a:buFont typeface="Arial" panose="020B0604020202020204" pitchFamily="34" charset="0"/>
+              <a:buChar char="•"/>
+            </a:pPr>
+            <a:r>
+              <a:rPr lang="en-US" b="0" i="1" dirty="0">
+                <a:solidFill>
+                  <a:srgbClr val="111111"/>
+                </a:solidFill>
+                <a:effectLst/>
+                <a:latin typeface="SourceSansPro"/>
+              </a:rPr>
+              <a:t>d</a:t>
+            </a:r>
+            <a:r>
+              <a:rPr lang="en-US" b="0" i="0" dirty="0">
+                <a:solidFill>
+                  <a:srgbClr val="111111"/>
+                </a:solidFill>
+                <a:effectLst/>
+                <a:latin typeface="SourceSansPro"/>
+              </a:rPr>
+              <a:t>: the number of times that the raw observations are differenced; also known as the degree of differencing.</a:t>
+            </a:r>
+          </a:p>
+          <a:p>
+            <a:pPr algn="l">
+              <a:buFont typeface="Arial" panose="020B0604020202020204" pitchFamily="34" charset="0"/>
+              <a:buChar char="•"/>
+            </a:pPr>
+            <a:r>
+              <a:rPr lang="en-US" b="0" i="0" dirty="0">
+                <a:solidFill>
+                  <a:srgbClr val="111111"/>
+                </a:solidFill>
+                <a:effectLst/>
+                <a:latin typeface="SourceSansPro"/>
+              </a:rPr>
+              <a:t>q: the size of the moving average window; also known as the order of the moving average.</a:t>
+            </a:r>
+          </a:p>
+          <a:p>
+            <a:endParaRPr lang="en-US" dirty="0"/>
+          </a:p>
+        </p:txBody>
+      </p:sp>
+    </p:spTree>
+    <p:extLst>
+      <p:ext uri="{BB962C8B-B14F-4D97-AF65-F5344CB8AC3E}">
+        <p14:creationId xmlns:p14="http://schemas.microsoft.com/office/powerpoint/2010/main" val="842422574"/>
+      </p:ext>
+    </p:extLst>
+  </p:cSld>
+  <p:clrMapOvr>
+    <a:masterClrMapping/>
+  </p:clrMapOvr>
+</p:sld>
+</file>
+
+<file path=ppt/slides/slide7.xml><?xml version="1.0" encoding="utf-8"?>
 <p:sld xmlns:a="http://schemas.openxmlformats.org/drawingml/2006/main" xmlns:r="http://schemas.openxmlformats.org/officeDocument/2006/relationships" xmlns:p="http://schemas.openxmlformats.org/presentationml/2006/main">
   <p:cSld>
     <p:spTree>

</xml_diff>